<commit_message>
Complete Double Buffering PP and remove Word Doc
</commit_message>
<xml_diff>
--- a/Programming 4/04.2 Double Buffering/04.2 Double Buffering.pptx
+++ b/Programming 4/04.2 Double Buffering/04.2 Double Buffering.pptx
@@ -5,15 +5,16 @@
     <p:sldMasterId id="2147483648" r:id="rId1"/>
   </p:sldMasterIdLst>
   <p:notesMasterIdLst>
-    <p:notesMasterId r:id="rId8"/>
+    <p:notesMasterId r:id="rId9"/>
   </p:notesMasterIdLst>
   <p:sldIdLst>
     <p:sldId id="256" r:id="rId2"/>
     <p:sldId id="257" r:id="rId3"/>
     <p:sldId id="258" r:id="rId4"/>
-    <p:sldId id="259" r:id="rId5"/>
-    <p:sldId id="260" r:id="rId6"/>
-    <p:sldId id="261" r:id="rId7"/>
+    <p:sldId id="262" r:id="rId5"/>
+    <p:sldId id="259" r:id="rId6"/>
+    <p:sldId id="260" r:id="rId7"/>
+    <p:sldId id="263" r:id="rId8"/>
   </p:sldIdLst>
   <p:sldSz cx="9144000" cy="6858000" type="screen4x3"/>
   <p:notesSz cx="6858000" cy="9144000"/>
@@ -1003,7 +1004,7 @@
     </p:spTree>
     <p:extLst>
       <p:ext uri="{BB962C8B-B14F-4D97-AF65-F5344CB8AC3E}">
-        <p14:creationId xmlns:p14="http://schemas.microsoft.com/office/powerpoint/2010/main" val="793580285"/>
+        <p14:creationId xmlns:p14="http://schemas.microsoft.com/office/powerpoint/2010/main" val="726519893"/>
       </p:ext>
     </p:extLst>
   </p:cSld>
@@ -1091,7 +1092,7 @@
     </p:spTree>
     <p:extLst>
       <p:ext uri="{BB962C8B-B14F-4D97-AF65-F5344CB8AC3E}">
-        <p14:creationId xmlns:p14="http://schemas.microsoft.com/office/powerpoint/2010/main" val="1090689022"/>
+        <p14:creationId xmlns:p14="http://schemas.microsoft.com/office/powerpoint/2010/main" val="793580285"/>
       </p:ext>
     </p:extLst>
   </p:cSld>
@@ -1149,6 +1150,26 @@
               <a:buFont typeface="Arial" charset="0"/>
               <a:buChar char="•"/>
             </a:pPr>
+            <a:r>
+              <a:rPr lang="en-AU" dirty="0" smtClean="0"/>
+              <a:t>Note: you can</a:t>
+            </a:r>
+            <a:r>
+              <a:rPr lang="en-AU" baseline="0" dirty="0" smtClean="0"/>
+              <a:t> call it </a:t>
+            </a:r>
+            <a:r>
+              <a:rPr lang="en-AU" baseline="0" dirty="0" err="1" smtClean="0"/>
+              <a:t>bufferImage</a:t>
+            </a:r>
+            <a:r>
+              <a:rPr lang="en-AU" baseline="0" dirty="0" smtClean="0"/>
+              <a:t> or </a:t>
+            </a:r>
+            <a:r>
+              <a:rPr lang="en-AU" baseline="0" dirty="0" err="1" smtClean="0"/>
+              <a:t>offScreenBitmap</a:t>
+            </a:r>
             <a:endParaRPr lang="en-US" dirty="0" smtClean="0"/>
           </a:p>
         </p:txBody>
@@ -1179,7 +1200,95 @@
     </p:spTree>
     <p:extLst>
       <p:ext uri="{BB962C8B-B14F-4D97-AF65-F5344CB8AC3E}">
-        <p14:creationId xmlns:p14="http://schemas.microsoft.com/office/powerpoint/2010/main" val="191373375"/>
+        <p14:creationId xmlns:p14="http://schemas.microsoft.com/office/powerpoint/2010/main" val="1090689022"/>
+      </p:ext>
+    </p:extLst>
+  </p:cSld>
+  <p:clrMapOvr>
+    <a:masterClrMapping/>
+  </p:clrMapOvr>
+</p:notes>
+</file>
+
+<file path=ppt/notesSlides/notesSlide6.xml><?xml version="1.0" encoding="utf-8"?>
+<p:notes xmlns:a="http://schemas.openxmlformats.org/drawingml/2006/main" xmlns:r="http://schemas.openxmlformats.org/officeDocument/2006/relationships" xmlns:p="http://schemas.openxmlformats.org/presentationml/2006/main">
+  <p:cSld>
+    <p:spTree>
+      <p:nvGrpSpPr>
+        <p:cNvPr id="1" name=""/>
+        <p:cNvGrpSpPr/>
+        <p:nvPr/>
+      </p:nvGrpSpPr>
+      <p:grpSpPr>
+        <a:xfrm>
+          <a:off x="0" y="0"/>
+          <a:ext cx="0" cy="0"/>
+          <a:chOff x="0" y="0"/>
+          <a:chExt cx="0" cy="0"/>
+        </a:xfrm>
+      </p:grpSpPr>
+      <p:sp>
+        <p:nvSpPr>
+          <p:cNvPr id="2" name="Slide Image Placeholder 1"/>
+          <p:cNvSpPr>
+            <a:spLocks noGrp="1" noRot="1" noChangeAspect="1"/>
+          </p:cNvSpPr>
+          <p:nvPr>
+            <p:ph type="sldImg"/>
+          </p:nvPr>
+        </p:nvSpPr>
+        <p:spPr/>
+      </p:sp>
+      <p:sp>
+        <p:nvSpPr>
+          <p:cNvPr id="3" name="Notes Placeholder 2"/>
+          <p:cNvSpPr>
+            <a:spLocks noGrp="1"/>
+          </p:cNvSpPr>
+          <p:nvPr>
+            <p:ph type="body" idx="1"/>
+          </p:nvPr>
+        </p:nvSpPr>
+        <p:spPr/>
+        <p:txBody>
+          <a:bodyPr/>
+          <a:lstStyle/>
+          <a:p>
+            <a:pPr marL="171450" indent="-171450">
+              <a:buFont typeface="Arial" charset="0"/>
+              <a:buChar char="•"/>
+            </a:pPr>
+            <a:endParaRPr lang="en-US" dirty="0" smtClean="0"/>
+          </a:p>
+        </p:txBody>
+      </p:sp>
+      <p:sp>
+        <p:nvSpPr>
+          <p:cNvPr id="4" name="Slide Number Placeholder 3"/>
+          <p:cNvSpPr>
+            <a:spLocks noGrp="1"/>
+          </p:cNvSpPr>
+          <p:nvPr>
+            <p:ph type="sldNum" sz="quarter" idx="10"/>
+          </p:nvPr>
+        </p:nvSpPr>
+        <p:spPr/>
+        <p:txBody>
+          <a:bodyPr/>
+          <a:lstStyle/>
+          <a:p>
+            <a:fld id="{5FA57C19-9E0E-4142-AAC1-12A23B691F36}" type="slidenum">
+              <a:rPr lang="en-US" smtClean="0"/>
+              <a:t>7</a:t>
+            </a:fld>
+            <a:endParaRPr lang="en-US"/>
+          </a:p>
+        </p:txBody>
+      </p:sp>
+    </p:spTree>
+    <p:extLst>
+      <p:ext uri="{BB962C8B-B14F-4D97-AF65-F5344CB8AC3E}">
+        <p14:creationId xmlns:p14="http://schemas.microsoft.com/office/powerpoint/2010/main" val="1921210852"/>
       </p:ext>
     </p:extLst>
   </p:cSld>
@@ -4577,7 +4686,7 @@
         <p:spPr>
           <a:xfrm>
             <a:off x="6096" y="6096"/>
-            <a:ext cx="9144000" cy="5224507"/>
+            <a:ext cx="9144000" cy="4378122"/>
           </a:xfrm>
           <a:prstGeom prst="rect">
             <a:avLst/>
@@ -4597,7 +4706,7 @@
             <a:pPr lvl="1"/>
             <a:r>
               <a:rPr lang="en-US" sz="3500" b="1" dirty="0" smtClean="0"/>
-              <a:t>Adding a background image</a:t>
+              <a:t>Making an in-memory drawing surface</a:t>
             </a:r>
             <a:endParaRPr lang="en-US" sz="3500" b="1" dirty="0" smtClean="0"/>
           </a:p>
@@ -4611,13 +4720,36 @@
               <a:buChar char="•"/>
             </a:pPr>
             <a:r>
-              <a:rPr lang="en-US" sz="2500" dirty="0" smtClean="0"/>
-              <a:t>Create </a:t>
-            </a:r>
-            <a:r>
-              <a:rPr lang="en-US" sz="2500" dirty="0" smtClean="0"/>
-              <a:t>a global Image object and initialise it with your background image</a:t>
-            </a:r>
+              <a:rPr lang="en-US" sz="2500" dirty="0"/>
+              <a:t>Create a Bitmap of the size you require</a:t>
+            </a:r>
+          </a:p>
+          <a:p>
+            <a:pPr marL="2114550" lvl="3" indent="-742950">
+              <a:buFont typeface="Arial" panose="020B0604020202020204" pitchFamily="34" charset="0"/>
+              <a:buChar char="•"/>
+            </a:pPr>
+            <a:r>
+              <a:rPr lang="en-US" sz="2000" dirty="0"/>
+              <a:t>Bitmap^ </a:t>
+            </a:r>
+            <a:r>
+              <a:rPr lang="en-US" sz="2000" dirty="0" err="1" smtClean="0"/>
+              <a:t>bufferImage</a:t>
+            </a:r>
+            <a:r>
+              <a:rPr lang="en-US" sz="2000" dirty="0" smtClean="0"/>
+              <a:t> </a:t>
+            </a:r>
+            <a:r>
+              <a:rPr lang="en-US" sz="2000" dirty="0"/>
+              <a:t>= gcnew Bitmap(800</a:t>
+            </a:r>
+            <a:r>
+              <a:rPr lang="en-US" sz="2000" dirty="0" smtClean="0"/>
+              <a:t>, 600);</a:t>
+            </a:r>
+            <a:endParaRPr lang="en-US" sz="2000" dirty="0"/>
           </a:p>
           <a:p>
             <a:pPr marL="1657350" lvl="2" indent="-742950">
@@ -4626,25 +4758,43 @@
             </a:pPr>
             <a:r>
               <a:rPr lang="en-US" sz="2500" dirty="0"/>
-              <a:t>Create your in-memory Bitmap^ offScreenBitmap </a:t>
-            </a:r>
-            <a:endParaRPr lang="en-US" sz="2500" dirty="0" smtClean="0"/>
-          </a:p>
-          <a:p>
-            <a:pPr lvl="2"/>
-            <a:r>
-              <a:rPr lang="en-US" sz="2500" dirty="0"/>
-              <a:t>	</a:t>
-            </a:r>
-            <a:r>
-              <a:rPr lang="en-US" sz="2500" dirty="0" smtClean="0"/>
-              <a:t>and </a:t>
-            </a:r>
-            <a:r>
-              <a:rPr lang="en-US" sz="2500" dirty="0"/>
-              <a:t>Graphics^ offScreenCanvas </a:t>
-            </a:r>
-            <a:endParaRPr lang="en-US" sz="2500" dirty="0" smtClean="0"/>
+              <a:t>Create a Graphics bound to the Bitmap</a:t>
+            </a:r>
+          </a:p>
+          <a:p>
+            <a:pPr marL="2114550" lvl="3" indent="-742950">
+              <a:buFont typeface="Arial" panose="020B0604020202020204" pitchFamily="34" charset="0"/>
+              <a:buChar char="•"/>
+            </a:pPr>
+            <a:r>
+              <a:rPr lang="en-US" sz="2000" dirty="0"/>
+              <a:t>Graphics^ </a:t>
+            </a:r>
+            <a:r>
+              <a:rPr lang="en-US" sz="2000" dirty="0" smtClean="0"/>
+              <a:t>bufferGraphics = </a:t>
+            </a:r>
+            <a:r>
+              <a:rPr lang="en-US" sz="2000" dirty="0"/>
+              <a:t>Graphics::</a:t>
+            </a:r>
+            <a:r>
+              <a:rPr lang="en-US" sz="2000" dirty="0" err="1" smtClean="0"/>
+              <a:t>FromImage</a:t>
+            </a:r>
+            <a:r>
+              <a:rPr lang="en-US" sz="2000" dirty="0" smtClean="0"/>
+              <a:t>(</a:t>
+            </a:r>
+            <a:r>
+              <a:rPr lang="en-US" sz="2000" dirty="0" err="1" smtClean="0"/>
+              <a:t>bufferImage</a:t>
+            </a:r>
+            <a:r>
+              <a:rPr lang="en-US" sz="2000" dirty="0" smtClean="0"/>
+              <a:t>);</a:t>
+            </a:r>
+            <a:endParaRPr lang="en-US" sz="2500" dirty="0"/>
           </a:p>
           <a:p>
             <a:pPr marL="1657350" lvl="2" indent="-742950">
@@ -4652,8 +4802,8 @@
               <a:buChar char="•"/>
             </a:pPr>
             <a:r>
-              <a:rPr lang="en-US" sz="2500" dirty="0" smtClean="0"/>
-              <a:t>At each game cycle:</a:t>
+              <a:rPr lang="en-US" sz="2500" dirty="0"/>
+              <a:t>Draw on the Graphics as usual</a:t>
             </a:r>
           </a:p>
           <a:p>
@@ -4662,8 +4812,35 @@
               <a:buChar char="•"/>
             </a:pPr>
             <a:r>
+              <a:rPr lang="en-US" sz="2000" dirty="0"/>
+              <a:t>bufferGraphics </a:t>
+            </a:r>
+            <a:r>
               <a:rPr lang="en-US" sz="2000" dirty="0" smtClean="0"/>
-              <a:t>Draw the background image to offScreenCanvas</a:t>
+              <a:t>-&gt;DrawImage(</a:t>
+            </a:r>
+            <a:r>
+              <a:rPr lang="en-US" sz="2000" dirty="0" err="1" smtClean="0"/>
+              <a:t>backgroundImage</a:t>
+            </a:r>
+            <a:r>
+              <a:rPr lang="en-US" sz="2000" dirty="0"/>
+              <a:t>, 0, 0</a:t>
+            </a:r>
+            <a:r>
+              <a:rPr lang="en-US" sz="2000" dirty="0" smtClean="0"/>
+              <a:t>)</a:t>
+            </a:r>
+            <a:endParaRPr lang="en-US" sz="2500" dirty="0"/>
+          </a:p>
+          <a:p>
+            <a:pPr marL="1657350" lvl="2" indent="-742950">
+              <a:buFont typeface="Arial" panose="020B0604020202020204" pitchFamily="34" charset="0"/>
+              <a:buChar char="•"/>
+            </a:pPr>
+            <a:r>
+              <a:rPr lang="en-US" sz="2500" dirty="0"/>
+              <a:t>Draw the Bitmap to your main Form canvas</a:t>
             </a:r>
           </a:p>
           <a:p>
@@ -4672,40 +4849,37 @@
               <a:buChar char="•"/>
             </a:pPr>
             <a:r>
+              <a:rPr lang="en-US" sz="2000" dirty="0" err="1" smtClean="0"/>
+              <a:t>mainCanvas</a:t>
+            </a:r>
+            <a:r>
               <a:rPr lang="en-US" sz="2000" dirty="0" smtClean="0"/>
-              <a:t>Have your sprites draw themselves to offScreenCanvas</a:t>
-            </a:r>
-          </a:p>
-          <a:p>
-            <a:pPr marL="2114550" lvl="3" indent="-742950">
-              <a:buFont typeface="Arial" panose="020B0604020202020204" pitchFamily="34" charset="0"/>
-              <a:buChar char="•"/>
-            </a:pPr>
+              <a:t>&gt;DrawImage(</a:t>
+            </a:r>
+            <a:r>
+              <a:rPr lang="en-US" sz="2000" dirty="0" err="1" smtClean="0"/>
+              <a:t>bufferImage</a:t>
+            </a:r>
             <a:r>
               <a:rPr lang="en-US" sz="2000" dirty="0" smtClean="0"/>
-              <a:t>Draw offScreenBitmap to the Form</a:t>
-            </a:r>
-          </a:p>
-          <a:p>
-            <a:pPr marL="1657350" lvl="2" indent="-742950">
-              <a:buFont typeface="Arial" panose="020B0604020202020204" pitchFamily="34" charset="0"/>
-              <a:buChar char="•"/>
-            </a:pPr>
-            <a:endParaRPr lang="en-US" sz="2500" dirty="0"/>
-          </a:p>
-          <a:p>
-            <a:pPr marL="1657350" lvl="2" indent="-742950">
-              <a:buFont typeface="Arial" panose="020B0604020202020204" pitchFamily="34" charset="0"/>
-              <a:buChar char="•"/>
-            </a:pPr>
-            <a:endParaRPr lang="en-US" sz="2500" dirty="0" smtClean="0"/>
+              <a:t>, </a:t>
+            </a:r>
+            <a:r>
+              <a:rPr lang="en-US" sz="2000" dirty="0"/>
+              <a:t>x</a:t>
+            </a:r>
+            <a:r>
+              <a:rPr lang="en-US" sz="2000" dirty="0" smtClean="0"/>
+              <a:t>, y);</a:t>
+            </a:r>
+            <a:endParaRPr lang="en-US" sz="2000" dirty="0"/>
           </a:p>
         </p:txBody>
       </p:sp>
     </p:spTree>
     <p:extLst>
       <p:ext uri="{BB962C8B-B14F-4D97-AF65-F5344CB8AC3E}">
-        <p14:creationId xmlns:p14="http://schemas.microsoft.com/office/powerpoint/2010/main" val="1752072907"/>
+        <p14:creationId xmlns:p14="http://schemas.microsoft.com/office/powerpoint/2010/main" val="2092839958"/>
       </p:ext>
     </p:extLst>
   </p:cSld>
@@ -4759,7 +4933,7 @@
         <p:spPr>
           <a:xfrm>
             <a:off x="6096" y="6096"/>
-            <a:ext cx="9144000" cy="1223412"/>
+            <a:ext cx="9144000" cy="5224507"/>
           </a:xfrm>
           <a:prstGeom prst="rect">
             <a:avLst/>
@@ -4779,16 +4953,115 @@
             <a:pPr lvl="1"/>
             <a:r>
               <a:rPr lang="en-US" sz="3500" b="1" dirty="0" smtClean="0"/>
-              <a:t>Timer code</a:t>
-            </a:r>
+              <a:t>Adding a background image</a:t>
+            </a:r>
+            <a:endParaRPr lang="en-US" sz="3500" b="1" dirty="0" smtClean="0"/>
+          </a:p>
+          <a:p>
+            <a:pPr lvl="1"/>
+            <a:endParaRPr lang="en-US" sz="2500" dirty="0" smtClean="0"/>
+          </a:p>
+          <a:p>
+            <a:pPr marL="1657350" lvl="2" indent="-742950">
+              <a:buFont typeface="Arial" panose="020B0604020202020204" pitchFamily="34" charset="0"/>
+              <a:buChar char="•"/>
+            </a:pPr>
+            <a:r>
+              <a:rPr lang="en-US" sz="2500" dirty="0" smtClean="0"/>
+              <a:t>Create </a:t>
+            </a:r>
+            <a:r>
+              <a:rPr lang="en-US" sz="2500" dirty="0" smtClean="0"/>
+              <a:t>a global Image object and initialise it with your background image</a:t>
+            </a:r>
+          </a:p>
+          <a:p>
+            <a:pPr marL="1657350" lvl="2" indent="-742950">
+              <a:buFont typeface="Arial" panose="020B0604020202020204" pitchFamily="34" charset="0"/>
+              <a:buChar char="•"/>
+            </a:pPr>
+            <a:r>
+              <a:rPr lang="en-US" sz="2500" dirty="0"/>
+              <a:t>Create your in-memory Bitmap^ offScreenBitmap </a:t>
+            </a:r>
+            <a:endParaRPr lang="en-US" sz="2500" dirty="0" smtClean="0"/>
+          </a:p>
+          <a:p>
+            <a:pPr lvl="2"/>
+            <a:r>
+              <a:rPr lang="en-US" sz="2500" dirty="0"/>
+              <a:t>	</a:t>
+            </a:r>
+            <a:r>
+              <a:rPr lang="en-US" sz="2500" dirty="0" smtClean="0"/>
+              <a:t>and </a:t>
+            </a:r>
+            <a:r>
+              <a:rPr lang="en-US" sz="2500" dirty="0"/>
+              <a:t>Graphics^ offScreenCanvas </a:t>
+            </a:r>
+            <a:endParaRPr lang="en-US" sz="2500" dirty="0" smtClean="0"/>
+          </a:p>
+          <a:p>
+            <a:pPr marL="1657350" lvl="2" indent="-742950">
+              <a:buFont typeface="Arial" panose="020B0604020202020204" pitchFamily="34" charset="0"/>
+              <a:buChar char="•"/>
+            </a:pPr>
+            <a:r>
+              <a:rPr lang="en-US" sz="2500" dirty="0" smtClean="0"/>
+              <a:t>At each game cycle:</a:t>
+            </a:r>
+          </a:p>
+          <a:p>
+            <a:pPr marL="2114550" lvl="3" indent="-742950">
+              <a:buFont typeface="Arial" panose="020B0604020202020204" pitchFamily="34" charset="0"/>
+              <a:buChar char="•"/>
+            </a:pPr>
+            <a:r>
+              <a:rPr lang="en-US" sz="2000" dirty="0" smtClean="0"/>
+              <a:t>Draw the background image to offScreenCanvas</a:t>
+            </a:r>
+          </a:p>
+          <a:p>
+            <a:pPr marL="2114550" lvl="3" indent="-742950">
+              <a:buFont typeface="Arial" panose="020B0604020202020204" pitchFamily="34" charset="0"/>
+              <a:buChar char="•"/>
+            </a:pPr>
+            <a:r>
+              <a:rPr lang="en-US" sz="2000" dirty="0" smtClean="0"/>
+              <a:t>Have your sprites draw themselves to offScreenCanvas</a:t>
+            </a:r>
+          </a:p>
+          <a:p>
+            <a:pPr marL="2114550" lvl="3" indent="-742950">
+              <a:buFont typeface="Arial" panose="020B0604020202020204" pitchFamily="34" charset="0"/>
+              <a:buChar char="•"/>
+            </a:pPr>
+            <a:r>
+              <a:rPr lang="en-US" sz="2000" dirty="0" smtClean="0"/>
+              <a:t>Draw offScreenBitmap to the Form</a:t>
+            </a:r>
+          </a:p>
+          <a:p>
+            <a:pPr marL="1657350" lvl="2" indent="-742950">
+              <a:buFont typeface="Arial" panose="020B0604020202020204" pitchFamily="34" charset="0"/>
+              <a:buChar char="•"/>
+            </a:pPr>
             <a:endParaRPr lang="en-US" sz="2500" dirty="0"/>
+          </a:p>
+          <a:p>
+            <a:pPr marL="1657350" lvl="2" indent="-742950">
+              <a:buFont typeface="Arial" panose="020B0604020202020204" pitchFamily="34" charset="0"/>
+              <a:buChar char="•"/>
+            </a:pPr>
+            <a:endParaRPr lang="en-US" sz="2500" dirty="0" smtClean="0"/>
           </a:p>
         </p:txBody>
       </p:sp>
     </p:spTree>
     <p:extLst>
       <p:ext uri="{BB962C8B-B14F-4D97-AF65-F5344CB8AC3E}">
-        <p14:creationId xmlns:p14="http://schemas.microsoft.com/office/powerpoint/2010/main" val="456726200"/>
+        <p14:creationId xmlns:p14="http://schemas.microsoft.com/office/powerpoint/2010/main" val="1752072907"/>
       </p:ext>
     </p:extLst>
   </p:cSld>
@@ -4862,16 +5135,281 @@
             <a:pPr lvl="1"/>
             <a:r>
               <a:rPr lang="en-US" sz="3500" b="1" dirty="0" smtClean="0"/>
-              <a:t>Summary</a:t>
+              <a:t>Timer code</a:t>
             </a:r>
             <a:endParaRPr lang="en-US" sz="2500" dirty="0"/>
           </a:p>
         </p:txBody>
       </p:sp>
+      <p:pic>
+        <p:nvPicPr>
+          <p:cNvPr id="2" name="Picture 1"/>
+          <p:cNvPicPr>
+            <a:picLocks noChangeAspect="1"/>
+          </p:cNvPicPr>
+          <p:nvPr/>
+        </p:nvPicPr>
+        <p:blipFill>
+          <a:blip r:embed="rId3">
+            <a:extLst>
+              <a:ext uri="{28A0092B-C50C-407E-A947-70E740481C1C}">
+                <a14:useLocalDpi xmlns:a14="http://schemas.microsoft.com/office/drawing/2010/main" val="0"/>
+              </a:ext>
+            </a:extLst>
+          </a:blip>
+          <a:stretch>
+            <a:fillRect/>
+          </a:stretch>
+        </p:blipFill>
+        <p:spPr>
+          <a:xfrm>
+            <a:off x="768096" y="1752600"/>
+            <a:ext cx="7620000" cy="1513128"/>
+          </a:xfrm>
+          <a:prstGeom prst="rect">
+            <a:avLst/>
+          </a:prstGeom>
+        </p:spPr>
+      </p:pic>
     </p:spTree>
     <p:extLst>
       <p:ext uri="{BB962C8B-B14F-4D97-AF65-F5344CB8AC3E}">
-        <p14:creationId xmlns:p14="http://schemas.microsoft.com/office/powerpoint/2010/main" val="553141434"/>
+        <p14:creationId xmlns:p14="http://schemas.microsoft.com/office/powerpoint/2010/main" val="456726200"/>
+      </p:ext>
+    </p:extLst>
+  </p:cSld>
+  <p:clrMapOvr>
+    <a:masterClrMapping/>
+  </p:clrMapOvr>
+  <p:timing>
+    <p:tnLst>
+      <p:par>
+        <p:cTn id="1" dur="indefinite" restart="never" nodeType="tmRoot"/>
+      </p:par>
+    </p:tnLst>
+  </p:timing>
+</p:sld>
+</file>
+
+<file path=ppt/slides/slide7.xml><?xml version="1.0" encoding="utf-8"?>
+<p:sld xmlns:a="http://schemas.openxmlformats.org/drawingml/2006/main" xmlns:r="http://schemas.openxmlformats.org/officeDocument/2006/relationships" xmlns:p="http://schemas.openxmlformats.org/presentationml/2006/main">
+  <p:cSld>
+    <p:bg>
+      <p:bgPr>
+        <a:solidFill>
+          <a:schemeClr val="accent5">
+            <a:lumMod val="60000"/>
+            <a:lumOff val="40000"/>
+          </a:schemeClr>
+        </a:solidFill>
+        <a:effectLst/>
+      </p:bgPr>
+    </p:bg>
+    <p:spTree>
+      <p:nvGrpSpPr>
+        <p:cNvPr id="1" name=""/>
+        <p:cNvGrpSpPr/>
+        <p:nvPr/>
+      </p:nvGrpSpPr>
+      <p:grpSpPr>
+        <a:xfrm>
+          <a:off x="0" y="0"/>
+          <a:ext cx="0" cy="0"/>
+          <a:chOff x="0" y="0"/>
+          <a:chExt cx="0" cy="0"/>
+        </a:xfrm>
+      </p:grpSpPr>
+      <p:sp>
+        <p:nvSpPr>
+          <p:cNvPr id="5" name="Rectangle 4"/>
+          <p:cNvSpPr/>
+          <p:nvPr/>
+        </p:nvSpPr>
+        <p:spPr>
+          <a:xfrm>
+            <a:off x="6096" y="6096"/>
+            <a:ext cx="9144000" cy="5917004"/>
+          </a:xfrm>
+          <a:prstGeom prst="rect">
+            <a:avLst/>
+          </a:prstGeom>
+          <a:noFill/>
+        </p:spPr>
+        <p:txBody>
+          <a:bodyPr wrap="square" lIns="68580" tIns="34290" rIns="68580" bIns="34290">
+            <a:spAutoFit/>
+          </a:bodyPr>
+          <a:lstStyle/>
+          <a:p>
+            <a:pPr algn="ctr"/>
+            <a:endParaRPr lang="en-US" sz="4000" b="1" dirty="0" smtClean="0"/>
+          </a:p>
+          <a:p>
+            <a:pPr lvl="1"/>
+            <a:r>
+              <a:rPr lang="en-US" sz="3500" b="1" dirty="0" smtClean="0"/>
+              <a:t>Summary</a:t>
+            </a:r>
+            <a:endParaRPr lang="en-US" sz="3500" b="1" dirty="0" smtClean="0"/>
+          </a:p>
+          <a:p>
+            <a:pPr lvl="1"/>
+            <a:endParaRPr lang="en-US" sz="2500" dirty="0" smtClean="0"/>
+          </a:p>
+          <a:p>
+            <a:pPr marL="1657350" lvl="2" indent="-742950">
+              <a:buFont typeface="Arial" panose="020B0604020202020204" pitchFamily="34" charset="0"/>
+              <a:buChar char="•"/>
+            </a:pPr>
+            <a:r>
+              <a:rPr lang="en-US" sz="2500" dirty="0"/>
+              <a:t>In the </a:t>
+            </a:r>
+            <a:r>
+              <a:rPr lang="en-US" sz="2500" dirty="0" smtClean="0"/>
+              <a:t>MyForm_Load</a:t>
+            </a:r>
+            <a:endParaRPr lang="en-US" sz="2500" dirty="0"/>
+          </a:p>
+          <a:p>
+            <a:pPr marL="2114550" lvl="3" indent="-742950">
+              <a:buFont typeface="Arial" panose="020B0604020202020204" pitchFamily="34" charset="0"/>
+              <a:buChar char="•"/>
+            </a:pPr>
+            <a:r>
+              <a:rPr lang="en-US" sz="2000" dirty="0"/>
+              <a:t>Create an Image holding your background picture</a:t>
+            </a:r>
+          </a:p>
+          <a:p>
+            <a:pPr marL="2114550" lvl="3" indent="-742950">
+              <a:buFont typeface="Arial" panose="020B0604020202020204" pitchFamily="34" charset="0"/>
+              <a:buChar char="•"/>
+            </a:pPr>
+            <a:r>
+              <a:rPr lang="en-US" sz="2000" dirty="0"/>
+              <a:t>Create a Bitmap the size of your background</a:t>
+            </a:r>
+          </a:p>
+          <a:p>
+            <a:pPr marL="2114550" lvl="3" indent="-742950">
+              <a:buFont typeface="Arial" panose="020B0604020202020204" pitchFamily="34" charset="0"/>
+              <a:buChar char="•"/>
+            </a:pPr>
+            <a:r>
+              <a:rPr lang="en-US" sz="2000" dirty="0"/>
+              <a:t>Create a canvas (Graphics) from the Bitmap</a:t>
+            </a:r>
+          </a:p>
+          <a:p>
+            <a:pPr marL="2114550" lvl="3" indent="-742950">
+              <a:buFont typeface="Arial" panose="020B0604020202020204" pitchFamily="34" charset="0"/>
+              <a:buChar char="•"/>
+            </a:pPr>
+            <a:r>
+              <a:rPr lang="en-US" sz="2000" dirty="0"/>
+              <a:t>Create your Sprites, passing in this canvas </a:t>
+            </a:r>
+          </a:p>
+          <a:p>
+            <a:pPr marL="2114550" lvl="3" indent="-742950">
+              <a:buFont typeface="Arial" panose="020B0604020202020204" pitchFamily="34" charset="0"/>
+              <a:buChar char="•"/>
+            </a:pPr>
+            <a:r>
+              <a:rPr lang="en-US" sz="2000" dirty="0"/>
+              <a:t>Create your mainCanvas with </a:t>
+            </a:r>
+            <a:r>
+              <a:rPr lang="en-US" sz="2000"/>
+              <a:t>CreateGraphics</a:t>
+            </a:r>
+            <a:r>
+              <a:rPr lang="en-US" sz="2000" smtClean="0"/>
+              <a:t>()</a:t>
+            </a:r>
+            <a:endParaRPr lang="en-US" sz="2500" dirty="0"/>
+          </a:p>
+          <a:p>
+            <a:pPr marL="1657350" lvl="2" indent="-742950">
+              <a:buFont typeface="Arial" panose="020B0604020202020204" pitchFamily="34" charset="0"/>
+              <a:buChar char="•"/>
+            </a:pPr>
+            <a:r>
+              <a:rPr lang="en-US" sz="2500" dirty="0"/>
+              <a:t>In the Timer</a:t>
+            </a:r>
+          </a:p>
+          <a:p>
+            <a:pPr marL="2114550" lvl="3" indent="-742950">
+              <a:buFont typeface="Arial" panose="020B0604020202020204" pitchFamily="34" charset="0"/>
+              <a:buChar char="•"/>
+            </a:pPr>
+            <a:r>
+              <a:rPr lang="en-US" sz="2000" dirty="0"/>
+              <a:t>Draw the background Image to the </a:t>
+            </a:r>
+            <a:r>
+              <a:rPr lang="en-US" sz="2000" dirty="0" smtClean="0"/>
+              <a:t>bufferGraphics canvas</a:t>
+            </a:r>
+            <a:endParaRPr lang="en-US" sz="2000" dirty="0"/>
+          </a:p>
+          <a:p>
+            <a:pPr marL="2114550" lvl="3" indent="-742950">
+              <a:buFont typeface="Arial" panose="020B0604020202020204" pitchFamily="34" charset="0"/>
+              <a:buChar char="•"/>
+            </a:pPr>
+            <a:r>
+              <a:rPr lang="en-US" sz="2000" dirty="0" smtClean="0"/>
+              <a:t>Have the list make the sprites draw themselves (they draw </a:t>
+            </a:r>
+          </a:p>
+          <a:p>
+            <a:pPr lvl="3"/>
+            <a:r>
+              <a:rPr lang="en-US" sz="2000" dirty="0"/>
+              <a:t>	</a:t>
+            </a:r>
+            <a:r>
+              <a:rPr lang="en-US" sz="2000" dirty="0" smtClean="0"/>
+              <a:t>	to the bufferGraphics canvas)</a:t>
+            </a:r>
+          </a:p>
+          <a:p>
+            <a:pPr marL="2114550" lvl="3" indent="-742950">
+              <a:buFont typeface="Arial" panose="020B0604020202020204" pitchFamily="34" charset="0"/>
+              <a:buChar char="•"/>
+            </a:pPr>
+            <a:r>
+              <a:rPr lang="en-US" sz="2000" dirty="0" smtClean="0"/>
+              <a:t>Draw </a:t>
+            </a:r>
+            <a:r>
+              <a:rPr lang="en-US" sz="2000" dirty="0"/>
+              <a:t>the Bitmap to the mainCanvas</a:t>
+            </a:r>
+          </a:p>
+          <a:p>
+            <a:pPr marL="1657350" lvl="2" indent="-742950">
+              <a:buFont typeface="Arial" panose="020B0604020202020204" pitchFamily="34" charset="0"/>
+              <a:buChar char="•"/>
+            </a:pPr>
+            <a:endParaRPr lang="en-US" sz="2500" dirty="0"/>
+          </a:p>
+          <a:p>
+            <a:pPr marL="1657350" lvl="2" indent="-742950">
+              <a:buFont typeface="Arial" panose="020B0604020202020204" pitchFamily="34" charset="0"/>
+              <a:buChar char="•"/>
+            </a:pPr>
+            <a:endParaRPr lang="en-US" sz="2500" dirty="0" smtClean="0"/>
+          </a:p>
+        </p:txBody>
+      </p:sp>
+    </p:spTree>
+    <p:extLst>
+      <p:ext uri="{BB962C8B-B14F-4D97-AF65-F5344CB8AC3E}">
+        <p14:creationId xmlns:p14="http://schemas.microsoft.com/office/powerpoint/2010/main" val="113576884"/>
       </p:ext>
     </p:extLst>
   </p:cSld>

</xml_diff>

<commit_message>
Update 4.2 Double Buffering
</commit_message>
<xml_diff>
--- a/Programming 4/04.2 Double Buffering/04.2 Double Buffering.pptx
+++ b/Programming 4/04.2 Double Buffering/04.2 Double Buffering.pptx
@@ -214,7 +214,7 @@
           <a:p>
             <a:fld id="{AA3B00FA-CC5B-BC4C-B085-63A0CD3DE02D}" type="datetimeFigureOut">
               <a:rPr lang="en-US" smtClean="0"/>
-              <a:t>8/10/19</a:t>
+              <a:t>8/16/2019</a:t>
             </a:fld>
             <a:endParaRPr lang="en-US"/>
           </a:p>
@@ -1479,7 +1479,7 @@
           <a:p>
             <a:fld id="{F8166F1F-CE9B-4651-A6AA-CD717754106B}" type="datetimeFigureOut">
               <a:rPr lang="en-US" smtClean="0"/>
-              <a:t>8/10/19</a:t>
+              <a:t>8/16/2019</a:t>
             </a:fld>
             <a:endParaRPr lang="en-US"/>
           </a:p>
@@ -1644,7 +1644,7 @@
           <a:p>
             <a:fld id="{A76116CE-C4A3-4A05-B2D7-7C2E9A889C0F}" type="datetimeFigureOut">
               <a:rPr lang="en-US" smtClean="0"/>
-              <a:t>8/10/19</a:t>
+              <a:t>8/16/2019</a:t>
             </a:fld>
             <a:endParaRPr lang="en-US"/>
           </a:p>
@@ -1819,7 +1819,7 @@
           <a:p>
             <a:fld id="{A76116CE-C4A3-4A05-B2D7-7C2E9A889C0F}" type="datetimeFigureOut">
               <a:rPr lang="en-US" smtClean="0"/>
-              <a:t>8/10/19</a:t>
+              <a:t>8/16/2019</a:t>
             </a:fld>
             <a:endParaRPr lang="en-US"/>
           </a:p>
@@ -1986,7 +1986,7 @@
           <a:p>
             <a:fld id="{A76116CE-C4A3-4A05-B2D7-7C2E9A889C0F}" type="datetimeFigureOut">
               <a:rPr lang="en-US" smtClean="0"/>
-              <a:t>8/10/19</a:t>
+              <a:t>8/16/2019</a:t>
             </a:fld>
             <a:endParaRPr lang="en-US"/>
           </a:p>
@@ -2227,7 +2227,7 @@
           <a:p>
             <a:fld id="{A76116CE-C4A3-4A05-B2D7-7C2E9A889C0F}" type="datetimeFigureOut">
               <a:rPr lang="en-US" smtClean="0"/>
-              <a:t>8/10/19</a:t>
+              <a:t>8/16/2019</a:t>
             </a:fld>
             <a:endParaRPr lang="en-US"/>
           </a:p>
@@ -2510,7 +2510,7 @@
           <a:p>
             <a:fld id="{A76116CE-C4A3-4A05-B2D7-7C2E9A889C0F}" type="datetimeFigureOut">
               <a:rPr lang="en-US" smtClean="0"/>
-              <a:t>8/10/19</a:t>
+              <a:t>8/16/2019</a:t>
             </a:fld>
             <a:endParaRPr lang="en-US"/>
           </a:p>
@@ -2927,7 +2927,7 @@
           <a:p>
             <a:fld id="{A76116CE-C4A3-4A05-B2D7-7C2E9A889C0F}" type="datetimeFigureOut">
               <a:rPr lang="en-US" smtClean="0"/>
-              <a:t>8/10/19</a:t>
+              <a:t>8/16/2019</a:t>
             </a:fld>
             <a:endParaRPr lang="en-US"/>
           </a:p>
@@ -3040,7 +3040,7 @@
           <a:p>
             <a:fld id="{A76116CE-C4A3-4A05-B2D7-7C2E9A889C0F}" type="datetimeFigureOut">
               <a:rPr lang="en-US" smtClean="0"/>
-              <a:t>8/10/19</a:t>
+              <a:t>8/16/2019</a:t>
             </a:fld>
             <a:endParaRPr lang="en-US"/>
           </a:p>
@@ -3130,7 +3130,7 @@
           <a:p>
             <a:fld id="{A76116CE-C4A3-4A05-B2D7-7C2E9A889C0F}" type="datetimeFigureOut">
               <a:rPr lang="en-US" smtClean="0"/>
-              <a:t>8/10/19</a:t>
+              <a:t>8/16/2019</a:t>
             </a:fld>
             <a:endParaRPr lang="en-US"/>
           </a:p>
@@ -3402,7 +3402,7 @@
           <a:p>
             <a:fld id="{A76116CE-C4A3-4A05-B2D7-7C2E9A889C0F}" type="datetimeFigureOut">
               <a:rPr lang="en-US" smtClean="0"/>
-              <a:t>8/10/19</a:t>
+              <a:t>8/16/2019</a:t>
             </a:fld>
             <a:endParaRPr lang="en-US"/>
           </a:p>
@@ -3650,7 +3650,7 @@
           <a:p>
             <a:fld id="{A76116CE-C4A3-4A05-B2D7-7C2E9A889C0F}" type="datetimeFigureOut">
               <a:rPr lang="en-US" smtClean="0"/>
-              <a:t>8/10/19</a:t>
+              <a:t>8/16/2019</a:t>
             </a:fld>
             <a:endParaRPr lang="en-US"/>
           </a:p>
@@ -3858,7 +3858,7 @@
           <a:p>
             <a:fld id="{F8166F1F-CE9B-4651-A6AA-CD717754106B}" type="datetimeFigureOut">
               <a:rPr lang="en-US" smtClean="0"/>
-              <a:t>8/10/19</a:t>
+              <a:t>8/16/2019</a:t>
             </a:fld>
             <a:endParaRPr lang="en-US"/>
           </a:p>
@@ -4278,7 +4278,6 @@
               <a:rPr lang="en-US" sz="4000" b="1" dirty="0" smtClean="0"/>
               <a:t>04.2 Double Buffering</a:t>
             </a:r>
-            <a:endParaRPr lang="en-US" sz="4000" b="1" dirty="0" smtClean="0"/>
           </a:p>
           <a:p>
             <a:pPr algn="ctr"/>
@@ -4380,7 +4379,6 @@
               <a:rPr lang="en-US" sz="3500" b="1" dirty="0" smtClean="0"/>
               <a:t>Using background images</a:t>
             </a:r>
-            <a:endParaRPr lang="en-US" sz="3500" b="1" dirty="0" smtClean="0"/>
           </a:p>
           <a:p>
             <a:pPr lvl="1"/>
@@ -4524,7 +4522,6 @@
               <a:rPr lang="en-US" sz="3500" b="1" dirty="0" smtClean="0"/>
               <a:t>Double buffering</a:t>
             </a:r>
-            <a:endParaRPr lang="en-US" sz="3500" b="1" dirty="0" smtClean="0"/>
           </a:p>
           <a:p>
             <a:pPr lvl="1"/>
@@ -4708,7 +4705,6 @@
               <a:rPr lang="en-US" sz="3500" b="1" dirty="0" smtClean="0"/>
               <a:t>Making an in-memory drawing surface</a:t>
             </a:r>
-            <a:endParaRPr lang="en-US" sz="3500" b="1" dirty="0" smtClean="0"/>
           </a:p>
           <a:p>
             <a:pPr lvl="1"/>
@@ -4955,7 +4951,6 @@
               <a:rPr lang="en-US" sz="3500" b="1" dirty="0" smtClean="0"/>
               <a:t>Adding a background image</a:t>
             </a:r>
-            <a:endParaRPr lang="en-US" sz="3500" b="1" dirty="0" smtClean="0"/>
           </a:p>
           <a:p>
             <a:pPr lvl="1"/>
@@ -4968,11 +4963,7 @@
             </a:pPr>
             <a:r>
               <a:rPr lang="en-US" sz="2500" dirty="0" smtClean="0"/>
-              <a:t>Create </a:t>
-            </a:r>
-            <a:r>
-              <a:rPr lang="en-US" sz="2500" dirty="0" smtClean="0"/>
-              <a:t>a global Image object and initialise it with your background image</a:t>
+              <a:t>Create a global Image object and initialise it with your background image</a:t>
             </a:r>
           </a:p>
           <a:p>
@@ -4982,7 +4973,15 @@
             </a:pPr>
             <a:r>
               <a:rPr lang="en-US" sz="2500" dirty="0"/>
-              <a:t>Create your in-memory Bitmap^ offScreenBitmap </a:t>
+              <a:t>Create your in-memory Bitmap^ </a:t>
+            </a:r>
+            <a:r>
+              <a:rPr lang="en-US" sz="2500" dirty="0" err="1" smtClean="0"/>
+              <a:t>bufferImage</a:t>
+            </a:r>
+            <a:r>
+              <a:rPr lang="en-US" sz="2500" dirty="0" smtClean="0"/>
+              <a:t> </a:t>
             </a:r>
             <a:endParaRPr lang="en-US" sz="2500" dirty="0" smtClean="0"/>
           </a:p>
@@ -4998,7 +4997,15 @@
             </a:r>
             <a:r>
               <a:rPr lang="en-US" sz="2500" dirty="0"/>
-              <a:t>Graphics^ offScreenCanvas </a:t>
+              <a:t>Graphics^ </a:t>
+            </a:r>
+            <a:r>
+              <a:rPr lang="en-US" sz="2500" dirty="0" err="1" smtClean="0"/>
+              <a:t>bufferGraphics</a:t>
+            </a:r>
+            <a:r>
+              <a:rPr lang="en-US" sz="2500" dirty="0" smtClean="0"/>
+              <a:t> </a:t>
             </a:r>
             <a:endParaRPr lang="en-US" sz="2500" dirty="0" smtClean="0"/>
           </a:p>
@@ -5019,8 +5026,13 @@
             </a:pPr>
             <a:r>
               <a:rPr lang="en-US" sz="2000" dirty="0" smtClean="0"/>
-              <a:t>Draw the background image to offScreenCanvas</a:t>
-            </a:r>
+              <a:t>Draw the background image to </a:t>
+            </a:r>
+            <a:r>
+              <a:rPr lang="en-US" sz="2000" dirty="0" err="1" smtClean="0"/>
+              <a:t>bufferGraphics</a:t>
+            </a:r>
+            <a:endParaRPr lang="en-US" sz="2000" dirty="0" smtClean="0"/>
           </a:p>
           <a:p>
             <a:pPr marL="2114550" lvl="3" indent="-742950">
@@ -5029,8 +5041,13 @@
             </a:pPr>
             <a:r>
               <a:rPr lang="en-US" sz="2000" dirty="0" smtClean="0"/>
-              <a:t>Have your sprites draw themselves to offScreenCanvas</a:t>
-            </a:r>
+              <a:t>Have your sprites draw themselves to </a:t>
+            </a:r>
+            <a:r>
+              <a:rPr lang="en-US" sz="2000" dirty="0" err="1"/>
+              <a:t>bufferGraphics</a:t>
+            </a:r>
+            <a:endParaRPr lang="en-US" sz="2000" dirty="0" smtClean="0"/>
           </a:p>
           <a:p>
             <a:pPr marL="2114550" lvl="3" indent="-742950">
@@ -5039,7 +5056,19 @@
             </a:pPr>
             <a:r>
               <a:rPr lang="en-US" sz="2000" dirty="0" smtClean="0"/>
-              <a:t>Draw offScreenBitmap to the Form</a:t>
+              <a:t>Draw </a:t>
+            </a:r>
+            <a:r>
+              <a:rPr lang="en-US" sz="2000" dirty="0" err="1" smtClean="0"/>
+              <a:t>bufferImage</a:t>
+            </a:r>
+            <a:r>
+              <a:rPr lang="en-US" sz="2000" dirty="0" smtClean="0"/>
+              <a:t> </a:t>
+            </a:r>
+            <a:r>
+              <a:rPr lang="en-US" sz="2000" dirty="0" smtClean="0"/>
+              <a:t>to the Form</a:t>
             </a:r>
           </a:p>
           <a:p>
@@ -5250,7 +5279,6 @@
               <a:rPr lang="en-US" sz="3500" b="1" dirty="0" smtClean="0"/>
               <a:t>Summary</a:t>
             </a:r>
-            <a:endParaRPr lang="en-US" sz="3500" b="1" dirty="0" smtClean="0"/>
           </a:p>
           <a:p>
             <a:pPr lvl="1"/>

</xml_diff>